<commit_message>
flowchart add to presentation
</commit_message>
<xml_diff>
--- a/DEMO_prezentacja2-polska.pptx
+++ b/DEMO_prezentacja2-polska.pptx
@@ -16,7 +16,8 @@
     <p:sldId id="295" r:id="rId10"/>
     <p:sldId id="259" r:id="rId11"/>
     <p:sldId id="261" r:id="rId12"/>
-    <p:sldId id="268" r:id="rId13"/>
+    <p:sldId id="298" r:id="rId13"/>
+    <p:sldId id="268" r:id="rId14"/>
   </p:sldIdLst>
   <p:sldSz cx="9144000" cy="6858000" type="screen4x3"/>
   <p:notesSz cx="9144000" cy="6858000"/>
@@ -277,7 +278,7 @@
           <a:p>
             <a:fld id="{1D8BD707-D9CF-40AE-B4C6-C98DA3205C09}" type="datetimeFigureOut">
               <a:rPr lang="en-US"/>
-              <a:t>1/3/2019</a:t>
+              <a:t>1/18/2019</a:t>
             </a:fld>
             <a:endParaRPr lang="en-US"/>
           </a:p>
@@ -364,7 +365,7 @@
           <a:p>
             <a:fld id="{1D8BD707-D9CF-40AE-B4C6-C98DA3205C09}" type="datetimeFigureOut">
               <a:rPr lang="en-US"/>
-              <a:t>1/3/2019</a:t>
+              <a:t>1/18/2019</a:t>
             </a:fld>
             <a:endParaRPr lang="en-US"/>
           </a:p>
@@ -508,7 +509,7 @@
           <a:p>
             <a:fld id="{1D8BD707-D9CF-40AE-B4C6-C98DA3205C09}" type="datetimeFigureOut">
               <a:rPr lang="en-US"/>
-              <a:t>1/3/2019</a:t>
+              <a:t>1/18/2019</a:t>
             </a:fld>
             <a:endParaRPr lang="en-US"/>
           </a:p>
@@ -690,7 +691,7 @@
           <a:p>
             <a:fld id="{1D8BD707-D9CF-40AE-B4C6-C98DA3205C09}" type="datetimeFigureOut">
               <a:rPr lang="en-US"/>
-              <a:t>1/3/2019</a:t>
+              <a:t>1/18/2019</a:t>
             </a:fld>
             <a:endParaRPr lang="en-US"/>
           </a:p>
@@ -806,7 +807,7 @@
           <a:p>
             <a:fld id="{1D8BD707-D9CF-40AE-B4C6-C98DA3205C09}" type="datetimeFigureOut">
               <a:rPr lang="en-US"/>
-              <a:t>1/3/2019</a:t>
+              <a:t>1/18/2019</a:t>
             </a:fld>
             <a:endParaRPr lang="en-US"/>
           </a:p>
@@ -893,7 +894,7 @@
           <a:p>
             <a:fld id="{1D8BD707-D9CF-40AE-B4C6-C98DA3205C09}" type="datetimeFigureOut">
               <a:rPr lang="en-US"/>
-              <a:t>1/3/2019</a:t>
+              <a:t>1/18/2019</a:t>
             </a:fld>
             <a:endParaRPr lang="en-US"/>
           </a:p>
@@ -1050,7 +1051,7 @@
           <a:p>
             <a:fld id="{1D8BD707-D9CF-40AE-B4C6-C98DA3205C09}" type="datetimeFigureOut">
               <a:rPr lang="en-US"/>
-              <a:t>1/3/2019</a:t>
+              <a:t>1/18/2019</a:t>
             </a:fld>
             <a:endParaRPr lang="en-US"/>
           </a:p>
@@ -1194,7 +1195,7 @@
           <a:p>
             <a:fld id="{1D8BD707-D9CF-40AE-B4C6-C98DA3205C09}" type="datetimeFigureOut">
               <a:rPr lang="en-US"/>
-              <a:t>1/3/2019</a:t>
+              <a:t>1/18/2019</a:t>
             </a:fld>
             <a:endParaRPr lang="en-US"/>
           </a:p>
@@ -1381,7 +1382,7 @@
           <a:p>
             <a:fld id="{1D8BD707-D9CF-40AE-B4C6-C98DA3205C09}" type="datetimeFigureOut">
               <a:rPr lang="en-US"/>
-              <a:t>1/3/2019</a:t>
+              <a:t>1/18/2019</a:t>
             </a:fld>
             <a:endParaRPr lang="en-US"/>
           </a:p>
@@ -1502,7 +1503,7 @@
           <a:p>
             <a:fld id="{1D8BD707-D9CF-40AE-B4C6-C98DA3205C09}" type="datetimeFigureOut">
               <a:rPr lang="en-US"/>
-              <a:t>1/3/2019</a:t>
+              <a:t>1/18/2019</a:t>
             </a:fld>
             <a:endParaRPr lang="en-US"/>
           </a:p>
@@ -1873,7 +1874,7 @@
           <a:p>
             <a:fld id="{1D8BD707-D9CF-40AE-B4C6-C98DA3205C09}" type="datetimeFigureOut">
               <a:rPr lang="en-US"/>
-              <a:t>1/3/2019</a:t>
+              <a:t>1/18/2019</a:t>
             </a:fld>
             <a:endParaRPr lang="en-US"/>
           </a:p>
@@ -2385,7 +2386,7 @@
           <a:p>
             <a:fld id="{1D8BD707-D9CF-40AE-B4C6-C98DA3205C09}" type="datetimeFigureOut">
               <a:rPr lang="en-US"/>
-              <a:t>1/3/2019</a:t>
+              <a:t>1/18/2019</a:t>
             </a:fld>
             <a:endParaRPr lang="en-US"/>
           </a:p>
@@ -3324,47 +3325,6 @@
           </a:p>
         </p:txBody>
       </p:sp>
-      <p:sp>
-        <p:nvSpPr>
-          <p:cNvPr id="6" name="object 6"/>
-          <p:cNvSpPr txBox="1">
-            <a:spLocks noGrp="1"/>
-          </p:cNvSpPr>
-          <p:nvPr>
-            <p:ph type="sldNum" sz="quarter" idx="4294967295"/>
-          </p:nvPr>
-        </p:nvSpPr>
-        <p:spPr>
-          <a:xfrm>
-            <a:off x="8505063" y="6530961"/>
-            <a:ext cx="502920" cy="276999"/>
-          </a:xfrm>
-          <a:prstGeom prst="rect">
-            <a:avLst/>
-          </a:prstGeom>
-        </p:spPr>
-        <p:txBody>
-          <a:bodyPr vert="horz" wrap="square" lIns="0" tIns="60960" rIns="0" bIns="0" rtlCol="0">
-            <a:spAutoFit/>
-          </a:bodyPr>
-          <a:lstStyle/>
-          <a:p>
-            <a:pPr marL="25400">
-              <a:lnSpc>
-                <a:spcPct val="100000"/>
-              </a:lnSpc>
-              <a:spcBef>
-                <a:spcPts val="480"/>
-              </a:spcBef>
-            </a:pPr>
-            <a:r>
-              <a:rPr lang="pl-PL" dirty="0"/>
-              <a:t>4/5</a:t>
-            </a:r>
-            <a:endParaRPr spc="-5" dirty="0"/>
-          </a:p>
-        </p:txBody>
-      </p:sp>
       <p:pic>
         <p:nvPicPr>
           <p:cNvPr id="7" name="Obraz 6">
@@ -3404,6 +3364,215 @@
 </file>
 
 <file path=ppt/slides/slide11.xml><?xml version="1.0" encoding="utf-8"?>
+<p:sld xmlns:a="http://schemas.openxmlformats.org/drawingml/2006/main" xmlns:r="http://schemas.openxmlformats.org/officeDocument/2006/relationships" xmlns:p="http://schemas.openxmlformats.org/presentationml/2006/main">
+  <p:cSld>
+    <p:spTree>
+      <p:nvGrpSpPr>
+        <p:cNvPr id="1" name=""/>
+        <p:cNvGrpSpPr/>
+        <p:nvPr/>
+      </p:nvGrpSpPr>
+      <p:grpSpPr>
+        <a:xfrm>
+          <a:off x="0" y="0"/>
+          <a:ext cx="0" cy="0"/>
+          <a:chOff x="0" y="0"/>
+          <a:chExt cx="0" cy="0"/>
+        </a:xfrm>
+      </p:grpSpPr>
+      <p:sp>
+        <p:nvSpPr>
+          <p:cNvPr id="2" name="object 2"/>
+          <p:cNvSpPr txBox="1">
+            <a:spLocks noGrp="1"/>
+          </p:cNvSpPr>
+          <p:nvPr>
+            <p:ph type="title"/>
+          </p:nvPr>
+        </p:nvSpPr>
+        <p:spPr>
+          <a:xfrm>
+            <a:off x="690168" y="919098"/>
+            <a:ext cx="5024120" cy="436880"/>
+          </a:xfrm>
+          <a:prstGeom prst="rect">
+            <a:avLst/>
+          </a:prstGeom>
+        </p:spPr>
+        <p:txBody>
+          <a:bodyPr vert="horz" wrap="square" lIns="0" tIns="12700" rIns="0" bIns="0" rtlCol="0">
+            <a:spAutoFit/>
+          </a:bodyPr>
+          <a:lstStyle/>
+          <a:p>
+            <a:pPr marL="12700">
+              <a:lnSpc>
+                <a:spcPct val="100000"/>
+              </a:lnSpc>
+              <a:spcBef>
+                <a:spcPts val="100"/>
+              </a:spcBef>
+            </a:pPr>
+            <a:r>
+              <a:rPr lang="pl-PL" sz="2700" dirty="0"/>
+              <a:t>Logika biznesowa</a:t>
+            </a:r>
+            <a:endParaRPr sz="2700" dirty="0"/>
+          </a:p>
+        </p:txBody>
+      </p:sp>
+      <p:sp>
+        <p:nvSpPr>
+          <p:cNvPr id="4" name="object 4"/>
+          <p:cNvSpPr/>
+          <p:nvPr/>
+        </p:nvSpPr>
+        <p:spPr>
+          <a:xfrm>
+            <a:off x="8541257" y="2292857"/>
+            <a:ext cx="429895" cy="428625"/>
+          </a:xfrm>
+          <a:custGeom>
+            <a:avLst/>
+            <a:gdLst/>
+            <a:ahLst/>
+            <a:cxnLst/>
+            <a:rect l="l" t="t" r="r" b="b"/>
+            <a:pathLst>
+              <a:path w="429895" h="428625">
+                <a:moveTo>
+                  <a:pt x="0" y="428244"/>
+                </a:moveTo>
+                <a:lnTo>
+                  <a:pt x="429768" y="428244"/>
+                </a:lnTo>
+                <a:lnTo>
+                  <a:pt x="429768" y="0"/>
+                </a:lnTo>
+                <a:lnTo>
+                  <a:pt x="0" y="0"/>
+                </a:lnTo>
+                <a:lnTo>
+                  <a:pt x="0" y="428244"/>
+                </a:lnTo>
+                <a:close/>
+              </a:path>
+            </a:pathLst>
+          </a:custGeom>
+          <a:solidFill>
+            <a:srgbClr val="FFFFFF"/>
+          </a:solidFill>
+        </p:spPr>
+        <p:txBody>
+          <a:bodyPr wrap="square" lIns="0" tIns="0" rIns="0" bIns="0" rtlCol="0"/>
+          <a:lstStyle/>
+          <a:p>
+            <a:endParaRPr/>
+          </a:p>
+        </p:txBody>
+      </p:sp>
+      <p:sp>
+        <p:nvSpPr>
+          <p:cNvPr id="5" name="object 5"/>
+          <p:cNvSpPr/>
+          <p:nvPr/>
+        </p:nvSpPr>
+        <p:spPr>
+          <a:xfrm>
+            <a:off x="8541257" y="2292857"/>
+            <a:ext cx="429895" cy="428625"/>
+          </a:xfrm>
+          <a:custGeom>
+            <a:avLst/>
+            <a:gdLst/>
+            <a:ahLst/>
+            <a:cxnLst/>
+            <a:rect l="l" t="t" r="r" b="b"/>
+            <a:pathLst>
+              <a:path w="429895" h="428625">
+                <a:moveTo>
+                  <a:pt x="0" y="428244"/>
+                </a:moveTo>
+                <a:lnTo>
+                  <a:pt x="429768" y="428244"/>
+                </a:lnTo>
+                <a:lnTo>
+                  <a:pt x="429768" y="0"/>
+                </a:lnTo>
+                <a:lnTo>
+                  <a:pt x="0" y="0"/>
+                </a:lnTo>
+                <a:lnTo>
+                  <a:pt x="0" y="428244"/>
+                </a:lnTo>
+                <a:close/>
+              </a:path>
+            </a:pathLst>
+          </a:custGeom>
+          <a:ln w="25908">
+            <a:solidFill>
+              <a:srgbClr val="FFFFFF"/>
+            </a:solidFill>
+          </a:ln>
+        </p:spPr>
+        <p:txBody>
+          <a:bodyPr wrap="square" lIns="0" tIns="0" rIns="0" bIns="0" rtlCol="0"/>
+          <a:lstStyle/>
+          <a:p>
+            <a:endParaRPr/>
+          </a:p>
+        </p:txBody>
+      </p:sp>
+      <p:pic>
+        <p:nvPicPr>
+          <p:cNvPr id="8" name="Obraz 7">
+            <a:extLst>
+              <a:ext uri="{FF2B5EF4-FFF2-40B4-BE49-F238E27FC236}">
+                <a16:creationId xmlns:a16="http://schemas.microsoft.com/office/drawing/2014/main" id="{D5B5F270-C4CE-4496-94BD-F46F6EB5DE48}"/>
+              </a:ext>
+            </a:extLst>
+          </p:cNvPr>
+          <p:cNvPicPr>
+            <a:picLocks noChangeAspect="1"/>
+          </p:cNvPicPr>
+          <p:nvPr/>
+        </p:nvPicPr>
+        <p:blipFill>
+          <a:blip r:embed="rId2" cstate="print">
+            <a:extLst>
+              <a:ext uri="{28A0092B-C50C-407E-A947-70E740481C1C}">
+                <a14:useLocalDpi xmlns:a14="http://schemas.microsoft.com/office/drawing/2010/main" val="0"/>
+              </a:ext>
+            </a:extLst>
+          </a:blip>
+          <a:stretch>
+            <a:fillRect/>
+          </a:stretch>
+        </p:blipFill>
+        <p:spPr>
+          <a:xfrm>
+            <a:off x="1850993" y="1828800"/>
+            <a:ext cx="5442014" cy="4955543"/>
+          </a:xfrm>
+          <a:prstGeom prst="rect">
+            <a:avLst/>
+          </a:prstGeom>
+        </p:spPr>
+      </p:pic>
+    </p:spTree>
+    <p:extLst>
+      <p:ext uri="{BB962C8B-B14F-4D97-AF65-F5344CB8AC3E}">
+        <p14:creationId xmlns:p14="http://schemas.microsoft.com/office/powerpoint/2010/main" val="592007138"/>
+      </p:ext>
+    </p:extLst>
+  </p:cSld>
+  <p:clrMapOvr>
+    <a:masterClrMapping/>
+  </p:clrMapOvr>
+</p:sld>
+</file>
+
+<file path=ppt/slides/slide12.xml><?xml version="1.0" encoding="utf-8"?>
 <p:sld xmlns:a="http://schemas.openxmlformats.org/drawingml/2006/main" xmlns:r="http://schemas.openxmlformats.org/officeDocument/2006/relationships" xmlns:p="http://schemas.openxmlformats.org/presentationml/2006/main" showMasterSp="0">
   <p:cSld>
     <p:spTree>

</xml_diff>